<commit_message>
slide deck v2 final.
</commit_message>
<xml_diff>
--- a/MMS 2017 - Windows Upgrade Readiness.pptx
+++ b/MMS 2017 - Windows Upgrade Readiness.pptx
@@ -304,7 +304,7 @@
           <a:p>
             <a:fld id="{5AC68C86-161C-47A6-9A61-C529F6A6AC98}" type="datetimeFigureOut">
               <a:rPr lang="en-US" smtClean="0"/>
-              <a:t>4/6/2017</a:t>
+              <a:t>4/10/2017</a:t>
             </a:fld>
             <a:endParaRPr lang="en-US"/>
           </a:p>
@@ -2368,6 +2368,11 @@
               <a:rPr lang="en-US" baseline="0" dirty="0"/>
               <a:t> deployment script and it can communicate to MS end points, you have enabled telemetry.  Even if you have a GPO in place to block it.</a:t>
             </a:r>
+          </a:p>
+          <a:p>
+            <a:endParaRPr lang="en-US" baseline="0" dirty="0"/>
+          </a:p>
+          <a:p>
             <a:endParaRPr lang="en-US" dirty="0"/>
           </a:p>
         </p:txBody>
@@ -2458,13 +2463,9 @@
             </a:r>
             <a:r>
               <a:rPr lang="en-US" baseline="0" dirty="0"/>
-              <a:t> to keep deploying them.  This is helpful if you plan on using this product, and why not keep using it?  Windows 10 will continue to need to </a:t>
-            </a:r>
-            <a:r>
-              <a:rPr lang="en-US" baseline="0"/>
-              <a:t>be serviced.</a:t>
-            </a:r>
-            <a:endParaRPr lang="en-US"/>
+              <a:t> to keep deploying them.  Definitely use an automated solution for this.  Keep patching, never stop patching.  This is helpful if you plan on using this product, and why not keep using it?  Windows 10 will continue to need to be serviced.</a:t>
+            </a:r>
+            <a:endParaRPr lang="en-US" dirty="0"/>
           </a:p>
           <a:p>
             <a:r>
@@ -2573,6 +2574,23 @@
               <a:rPr lang="en-US" baseline="0" dirty="0"/>
               <a:t> if needed, schedules the analytics to run monthly and run the analytics one time.  Logs can be seen in c:\windows\WUA\</a:t>
             </a:r>
+          </a:p>
+          <a:p>
+            <a:endParaRPr lang="en-US" baseline="0" dirty="0"/>
+          </a:p>
+          <a:p>
+            <a:r>
+              <a:rPr lang="en-US" baseline="0" dirty="0"/>
+              <a:t>Dirtiest script you will ever see.  This works, but there are more elegant ways to do it.  </a:t>
+            </a:r>
+            <a:r>
+              <a:rPr lang="en-US" baseline="0" dirty="0" err="1"/>
+              <a:t>ConfiMgr</a:t>
+            </a:r>
+            <a:r>
+              <a:rPr lang="en-US" baseline="0" dirty="0"/>
+              <a:t> Cis / baselines. Etc.</a:t>
+            </a:r>
             <a:endParaRPr lang="en-US" dirty="0"/>
           </a:p>
         </p:txBody>
@@ -2771,7 +2789,7 @@
             </a:r>
             <a:r>
               <a:rPr lang="en-US" baseline="0" dirty="0"/>
-              <a:t> your add/remove programs has custom strings in it, WU can handle that.  It determines what the actual application is independent of the Add Remove Programs.</a:t>
+              <a:t> your add/remove programs has custom strings in it, WU can handle that.  It determines what the actual application is independent of the Add Remove Programs.  This has pretty awesome implications and use cases. </a:t>
             </a:r>
             <a:endParaRPr lang="en-US" dirty="0"/>
           </a:p>
@@ -9301,22 +9319,19 @@
             <p:ph type="body" sz="quarter" idx="15"/>
           </p:nvPr>
         </p:nvSpPr>
-        <p:spPr/>
+        <p:spPr>
+          <a:xfrm>
+            <a:off x="575734" y="2845347"/>
+            <a:ext cx="5059228" cy="375110"/>
+          </a:xfrm>
+        </p:spPr>
         <p:txBody>
           <a:bodyPr/>
           <a:lstStyle/>
           <a:p>
             <a:r>
               <a:rPr lang="en-US" dirty="0"/>
-              <a:t>Microsoft MVP, </a:t>
-            </a:r>
-            <a:r>
-              <a:rPr lang="en-US" dirty="0" err="1"/>
-              <a:t>Entrprise</a:t>
-            </a:r>
-            <a:r>
-              <a:rPr lang="en-US" dirty="0"/>
-              <a:t> Mobility</a:t>
+              <a:t>Microsoft MVP, Enterprise Mobility</a:t>
             </a:r>
           </a:p>
         </p:txBody>
@@ -9338,7 +9353,7 @@
           <a:p>
             <a:r>
               <a:rPr lang="en-US" dirty="0"/>
-              <a:t>PowerShell Junky</a:t>
+              <a:t>PowerShell, Automation, Blog</a:t>
             </a:r>
           </a:p>
         </p:txBody>
@@ -9867,18 +9882,73 @@
             <a:pPr marL="457200" lvl="1" indent="0">
               <a:buNone/>
             </a:pPr>
-            <a:r>
-              <a:rPr lang="en-US" dirty="0"/>
-              <a:t>5000 item limits, even in </a:t>
-            </a:r>
-            <a:r>
-              <a:rPr lang="en-US" dirty="0" err="1"/>
-              <a:t>powershell</a:t>
-            </a:r>
-            <a:r>
-              <a:rPr lang="en-US" dirty="0"/>
-              <a:t>.</a:t>
-            </a:r>
+            <a:endParaRPr lang="en-US" dirty="0"/>
+          </a:p>
+          <a:p>
+            <a:pPr marL="457200" lvl="1" indent="0">
+              <a:buNone/>
+            </a:pPr>
+            <a:r>
+              <a:rPr lang="en-US" dirty="0"/>
+              <a:t>QUICK DEMOS</a:t>
+            </a:r>
+          </a:p>
+          <a:p>
+            <a:pPr marL="457200" lvl="1" indent="0">
+              <a:buNone/>
+            </a:pPr>
+            <a:endParaRPr lang="en-US" dirty="0"/>
+          </a:p>
+          <a:p>
+            <a:pPr marL="457200" lvl="1" indent="0">
+              <a:buNone/>
+            </a:pPr>
+            <a:r>
+              <a:rPr lang="en-US" dirty="0"/>
+              <a:t>5000 item limits, even in PowerShell.</a:t>
+            </a:r>
+          </a:p>
+          <a:p>
+            <a:pPr marL="457200" lvl="1" indent="0">
+              <a:buNone/>
+            </a:pPr>
+            <a:endParaRPr lang="en-US" dirty="0"/>
+          </a:p>
+          <a:p>
+            <a:pPr marL="457200" lvl="1" indent="0">
+              <a:buNone/>
+            </a:pPr>
+            <a:r>
+              <a:rPr lang="en-US" dirty="0"/>
+              <a:t>If you can navigate PowerShell, I think it’s easier to dissect the data than using OMS search queries…</a:t>
+            </a:r>
+          </a:p>
+          <a:p>
+            <a:pPr marL="457200" lvl="1" indent="0">
+              <a:buNone/>
+            </a:pPr>
+            <a:r>
+              <a:rPr lang="en-US" dirty="0"/>
+              <a:t>	or I am bad at OMS search queries.  </a:t>
+            </a:r>
+          </a:p>
+          <a:p>
+            <a:pPr marL="457200" lvl="1" indent="0">
+              <a:buNone/>
+            </a:pPr>
+            <a:endParaRPr lang="en-US" dirty="0"/>
+          </a:p>
+          <a:p>
+            <a:pPr marL="457200" lvl="1" indent="0">
+              <a:buNone/>
+            </a:pPr>
+            <a:endParaRPr lang="en-US" dirty="0"/>
+          </a:p>
+          <a:p>
+            <a:pPr marL="457200" lvl="1" indent="0">
+              <a:buNone/>
+            </a:pPr>
+            <a:endParaRPr lang="en-US" dirty="0"/>
           </a:p>
           <a:p>
             <a:pPr marL="457200" lvl="1" indent="0">

</xml_diff>

<commit_message>
intro and graphics updated
</commit_message>
<xml_diff>
--- a/MMS 2017 - Windows Upgrade Readiness.pptx
+++ b/MMS 2017 - Windows Upgrade Readiness.pptx
@@ -332,7 +332,7 @@
           <a:p>
             <a:fld id="{5AC68C86-161C-47A6-9A61-C529F6A6AC98}" type="datetimeFigureOut">
               <a:rPr lang="en-US" smtClean="0"/>
-              <a:t>5/12/2017</a:t>
+              <a:t>5/16/2017</a:t>
             </a:fld>
             <a:endParaRPr lang="en-US"/>
           </a:p>
@@ -11494,7 +11494,7 @@
       </p:sp>
       <p:pic>
         <p:nvPicPr>
-          <p:cNvPr id="5" name="Picture 4"/>
+          <p:cNvPr id="4" name="Picture 3"/>
           <p:cNvPicPr>
             <a:picLocks noChangeAspect="1"/>
           </p:cNvPicPr>
@@ -11508,8 +11508,8 @@
         </p:blipFill>
         <p:spPr>
           <a:xfrm>
-            <a:off x="904875" y="1857375"/>
-            <a:ext cx="10382250" cy="3143250"/>
+            <a:off x="1177159" y="2329449"/>
+            <a:ext cx="9942786" cy="2855591"/>
           </a:xfrm>
           <a:prstGeom prst="rect">
             <a:avLst/>
@@ -12167,14 +12167,121 @@
           <a:p>
             <a:r>
               <a:rPr lang="en-US" dirty="0"/>
-              <a:t>Forums, etc.</a:t>
+              <a:t>Forums, </a:t>
+            </a:r>
+            <a:r>
+              <a:rPr lang="en-US" dirty="0" err="1"/>
+              <a:t>reddit</a:t>
+            </a:r>
+            <a:r>
+              <a:rPr lang="en-US" dirty="0"/>
+              <a:t>, slack, etc.</a:t>
             </a:r>
           </a:p>
           <a:p>
             <a:endParaRPr lang="en-US" dirty="0"/>
           </a:p>
-        </p:txBody>
-      </p:sp>
+          <a:p>
+            <a:endParaRPr lang="en-US" dirty="0"/>
+          </a:p>
+        </p:txBody>
+      </p:sp>
+      <p:pic>
+        <p:nvPicPr>
+          <p:cNvPr id="3" name="Picture 2"/>
+          <p:cNvPicPr>
+            <a:picLocks noChangeAspect="1"/>
+          </p:cNvPicPr>
+          <p:nvPr/>
+        </p:nvPicPr>
+        <p:blipFill>
+          <a:blip r:embed="rId2"/>
+          <a:stretch>
+            <a:fillRect/>
+          </a:stretch>
+        </p:blipFill>
+        <p:spPr>
+          <a:xfrm>
+            <a:off x="7032569" y="1439261"/>
+            <a:ext cx="4086225" cy="952500"/>
+          </a:xfrm>
+          <a:prstGeom prst="rect">
+            <a:avLst/>
+          </a:prstGeom>
+        </p:spPr>
+      </p:pic>
+      <p:pic>
+        <p:nvPicPr>
+          <p:cNvPr id="5" name="Picture 4"/>
+          <p:cNvPicPr>
+            <a:picLocks noChangeAspect="1"/>
+          </p:cNvPicPr>
+          <p:nvPr/>
+        </p:nvPicPr>
+        <p:blipFill>
+          <a:blip r:embed="rId3"/>
+          <a:stretch>
+            <a:fillRect/>
+          </a:stretch>
+        </p:blipFill>
+        <p:spPr>
+          <a:xfrm>
+            <a:off x="7032569" y="2862913"/>
+            <a:ext cx="4297583" cy="1031420"/>
+          </a:xfrm>
+          <a:prstGeom prst="rect">
+            <a:avLst/>
+          </a:prstGeom>
+        </p:spPr>
+      </p:pic>
+      <p:pic>
+        <p:nvPicPr>
+          <p:cNvPr id="7" name="Picture 6"/>
+          <p:cNvPicPr>
+            <a:picLocks noChangeAspect="1"/>
+          </p:cNvPicPr>
+          <p:nvPr/>
+        </p:nvPicPr>
+        <p:blipFill>
+          <a:blip r:embed="rId4"/>
+          <a:stretch>
+            <a:fillRect/>
+          </a:stretch>
+        </p:blipFill>
+        <p:spPr>
+          <a:xfrm>
+            <a:off x="7032569" y="4365485"/>
+            <a:ext cx="4949219" cy="1042495"/>
+          </a:xfrm>
+          <a:prstGeom prst="rect">
+            <a:avLst/>
+          </a:prstGeom>
+        </p:spPr>
+      </p:pic>
+      <p:pic>
+        <p:nvPicPr>
+          <p:cNvPr id="8" name="Picture 7"/>
+          <p:cNvPicPr>
+            <a:picLocks noChangeAspect="1"/>
+          </p:cNvPicPr>
+          <p:nvPr/>
+        </p:nvPicPr>
+        <p:blipFill>
+          <a:blip r:embed="rId5"/>
+          <a:stretch>
+            <a:fillRect/>
+          </a:stretch>
+        </p:blipFill>
+        <p:spPr>
+          <a:xfrm>
+            <a:off x="7032857" y="5623356"/>
+            <a:ext cx="4549543" cy="905696"/>
+          </a:xfrm>
+          <a:prstGeom prst="rect">
+            <a:avLst/>
+          </a:prstGeom>
+        </p:spPr>
+      </p:pic>
     </p:spTree>
     <p:extLst>
       <p:ext uri="{BB962C8B-B14F-4D97-AF65-F5344CB8AC3E}">
@@ -21795,7 +21902,7 @@
           <a:p>
             <a:r>
               <a:rPr lang="en-US" dirty="0"/>
-              <a:t>mms2017XX@azurelab.org</a:t>
+              <a:t>mmsXX@azurelab.org</a:t>
             </a:r>
           </a:p>
         </p:txBody>

</xml_diff>